<commit_message>
Updated resume in June 2022
</commit_message>
<xml_diff>
--- a/images/project_logos.pptx
+++ b/images/project_logos.pptx
@@ -6,19 +6,20 @@
   </p:sldMasterIdLst>
   <p:sldIdLst>
     <p:sldId id="259" r:id="rId2"/>
-    <p:sldId id="260" r:id="rId3"/>
-    <p:sldId id="261" r:id="rId4"/>
-    <p:sldId id="262" r:id="rId5"/>
-    <p:sldId id="263" r:id="rId6"/>
-    <p:sldId id="265" r:id="rId7"/>
-    <p:sldId id="266" r:id="rId8"/>
-    <p:sldId id="267" r:id="rId9"/>
-    <p:sldId id="268" r:id="rId10"/>
-    <p:sldId id="269" r:id="rId11"/>
-    <p:sldId id="256" r:id="rId12"/>
-    <p:sldId id="258" r:id="rId13"/>
-    <p:sldId id="257" r:id="rId14"/>
-    <p:sldId id="264" r:id="rId15"/>
+    <p:sldId id="270" r:id="rId3"/>
+    <p:sldId id="260" r:id="rId4"/>
+    <p:sldId id="261" r:id="rId5"/>
+    <p:sldId id="262" r:id="rId6"/>
+    <p:sldId id="263" r:id="rId7"/>
+    <p:sldId id="265" r:id="rId8"/>
+    <p:sldId id="266" r:id="rId9"/>
+    <p:sldId id="267" r:id="rId10"/>
+    <p:sldId id="268" r:id="rId11"/>
+    <p:sldId id="269" r:id="rId12"/>
+    <p:sldId id="256" r:id="rId13"/>
+    <p:sldId id="258" r:id="rId14"/>
+    <p:sldId id="257" r:id="rId15"/>
+    <p:sldId id="264" r:id="rId16"/>
   </p:sldIdLst>
   <p:sldSz cx="12192000" cy="6858000"/>
   <p:notesSz cx="6858000" cy="9144000"/>
@@ -117,6 +118,11 @@
       </a:defRPr>
     </a:lvl9pPr>
   </p:defaultTextStyle>
+  <p:extLst>
+    <p:ext uri="{EFAFB233-063F-42B5-8137-9DF3F51BA10A}">
+      <p15:sldGuideLst xmlns:p15="http://schemas.microsoft.com/office/powerpoint/2012/main"/>
+    </p:ext>
+  </p:extLst>
 </p:presentation>
 </file>
 
@@ -162,10 +168,9 @@
           </a:lstStyle>
           <a:p>
             <a:r>
-              <a:rPr lang="en-US" smtClean="0"/>
+              <a:rPr lang="en-US"/>
               <a:t>Click to edit Master title style</a:t>
             </a:r>
-            <a:endParaRPr lang="en-US"/>
           </a:p>
         </p:txBody>
       </p:sp>
@@ -227,10 +232,9 @@
           </a:lstStyle>
           <a:p>
             <a:r>
-              <a:rPr lang="en-US" smtClean="0"/>
+              <a:rPr lang="en-US"/>
               <a:t>Click to edit Master subtitle style</a:t>
             </a:r>
-            <a:endParaRPr lang="en-US"/>
           </a:p>
         </p:txBody>
       </p:sp>
@@ -251,7 +255,7 @@
           <a:p>
             <a:fld id="{C119B99F-A9E0-4865-8538-81B3FF2BBAE8}" type="datetimeFigureOut">
               <a:rPr lang="en-US" smtClean="0"/>
-              <a:t>6/11/2015</a:t>
+              <a:t>6/7/22</a:t>
             </a:fld>
             <a:endParaRPr lang="en-US"/>
           </a:p>
@@ -345,10 +349,9 @@
           <a:lstStyle/>
           <a:p>
             <a:r>
-              <a:rPr lang="en-US" smtClean="0"/>
+              <a:rPr lang="en-US"/>
               <a:t>Click to edit Master title style</a:t>
             </a:r>
-            <a:endParaRPr lang="en-US"/>
           </a:p>
         </p:txBody>
       </p:sp>
@@ -369,38 +372,37 @@
           <a:p>
             <a:pPr lvl="0"/>
             <a:r>
-              <a:rPr lang="en-US" smtClean="0"/>
+              <a:rPr lang="en-US"/>
               <a:t>Click to edit Master text styles</a:t>
             </a:r>
           </a:p>
           <a:p>
             <a:pPr lvl="1"/>
             <a:r>
-              <a:rPr lang="en-US" smtClean="0"/>
+              <a:rPr lang="en-US"/>
               <a:t>Second level</a:t>
             </a:r>
           </a:p>
           <a:p>
             <a:pPr lvl="2"/>
             <a:r>
-              <a:rPr lang="en-US" smtClean="0"/>
+              <a:rPr lang="en-US"/>
               <a:t>Third level</a:t>
             </a:r>
           </a:p>
           <a:p>
             <a:pPr lvl="3"/>
             <a:r>
-              <a:rPr lang="en-US" smtClean="0"/>
+              <a:rPr lang="en-US"/>
               <a:t>Fourth level</a:t>
             </a:r>
           </a:p>
           <a:p>
             <a:pPr lvl="4"/>
             <a:r>
-              <a:rPr lang="en-US" smtClean="0"/>
+              <a:rPr lang="en-US"/>
               <a:t>Fifth level</a:t>
             </a:r>
-            <a:endParaRPr lang="en-US"/>
           </a:p>
         </p:txBody>
       </p:sp>
@@ -421,7 +423,7 @@
           <a:p>
             <a:fld id="{C119B99F-A9E0-4865-8538-81B3FF2BBAE8}" type="datetimeFigureOut">
               <a:rPr lang="en-US" smtClean="0"/>
-              <a:t>6/11/2015</a:t>
+              <a:t>6/7/22</a:t>
             </a:fld>
             <a:endParaRPr lang="en-US"/>
           </a:p>
@@ -520,10 +522,9 @@
           <a:lstStyle/>
           <a:p>
             <a:r>
-              <a:rPr lang="en-US" smtClean="0"/>
+              <a:rPr lang="en-US"/>
               <a:t>Click to edit Master title style</a:t>
             </a:r>
-            <a:endParaRPr lang="en-US"/>
           </a:p>
         </p:txBody>
       </p:sp>
@@ -549,38 +550,37 @@
           <a:p>
             <a:pPr lvl="0"/>
             <a:r>
-              <a:rPr lang="en-US" smtClean="0"/>
+              <a:rPr lang="en-US"/>
               <a:t>Click to edit Master text styles</a:t>
             </a:r>
           </a:p>
           <a:p>
             <a:pPr lvl="1"/>
             <a:r>
-              <a:rPr lang="en-US" smtClean="0"/>
+              <a:rPr lang="en-US"/>
               <a:t>Second level</a:t>
             </a:r>
           </a:p>
           <a:p>
             <a:pPr lvl="2"/>
             <a:r>
-              <a:rPr lang="en-US" smtClean="0"/>
+              <a:rPr lang="en-US"/>
               <a:t>Third level</a:t>
             </a:r>
           </a:p>
           <a:p>
             <a:pPr lvl="3"/>
             <a:r>
-              <a:rPr lang="en-US" smtClean="0"/>
+              <a:rPr lang="en-US"/>
               <a:t>Fourth level</a:t>
             </a:r>
           </a:p>
           <a:p>
             <a:pPr lvl="4"/>
             <a:r>
-              <a:rPr lang="en-US" smtClean="0"/>
+              <a:rPr lang="en-US"/>
               <a:t>Fifth level</a:t>
             </a:r>
-            <a:endParaRPr lang="en-US"/>
           </a:p>
         </p:txBody>
       </p:sp>
@@ -601,7 +601,7 @@
           <a:p>
             <a:fld id="{C119B99F-A9E0-4865-8538-81B3FF2BBAE8}" type="datetimeFigureOut">
               <a:rPr lang="en-US" smtClean="0"/>
-              <a:t>6/11/2015</a:t>
+              <a:t>6/7/22</a:t>
             </a:fld>
             <a:endParaRPr lang="en-US"/>
           </a:p>
@@ -695,10 +695,9 @@
           <a:lstStyle/>
           <a:p>
             <a:r>
-              <a:rPr lang="en-US" smtClean="0"/>
+              <a:rPr lang="en-US"/>
               <a:t>Click to edit Master title style</a:t>
             </a:r>
-            <a:endParaRPr lang="en-US"/>
           </a:p>
         </p:txBody>
       </p:sp>
@@ -719,38 +718,37 @@
           <a:p>
             <a:pPr lvl="0"/>
             <a:r>
-              <a:rPr lang="en-US" smtClean="0"/>
+              <a:rPr lang="en-US"/>
               <a:t>Click to edit Master text styles</a:t>
             </a:r>
           </a:p>
           <a:p>
             <a:pPr lvl="1"/>
             <a:r>
-              <a:rPr lang="en-US" smtClean="0"/>
+              <a:rPr lang="en-US"/>
               <a:t>Second level</a:t>
             </a:r>
           </a:p>
           <a:p>
             <a:pPr lvl="2"/>
             <a:r>
-              <a:rPr lang="en-US" smtClean="0"/>
+              <a:rPr lang="en-US"/>
               <a:t>Third level</a:t>
             </a:r>
           </a:p>
           <a:p>
             <a:pPr lvl="3"/>
             <a:r>
-              <a:rPr lang="en-US" smtClean="0"/>
+              <a:rPr lang="en-US"/>
               <a:t>Fourth level</a:t>
             </a:r>
           </a:p>
           <a:p>
             <a:pPr lvl="4"/>
             <a:r>
-              <a:rPr lang="en-US" smtClean="0"/>
+              <a:rPr lang="en-US"/>
               <a:t>Fifth level</a:t>
             </a:r>
-            <a:endParaRPr lang="en-US"/>
           </a:p>
         </p:txBody>
       </p:sp>
@@ -771,7 +769,7 @@
           <a:p>
             <a:fld id="{C119B99F-A9E0-4865-8538-81B3FF2BBAE8}" type="datetimeFigureOut">
               <a:rPr lang="en-US" smtClean="0"/>
-              <a:t>6/11/2015</a:t>
+              <a:t>6/7/22</a:t>
             </a:fld>
             <a:endParaRPr lang="en-US"/>
           </a:p>
@@ -874,10 +872,9 @@
           </a:lstStyle>
           <a:p>
             <a:r>
-              <a:rPr lang="en-US" smtClean="0"/>
+              <a:rPr lang="en-US"/>
               <a:t>Click to edit Master title style</a:t>
             </a:r>
-            <a:endParaRPr lang="en-US"/>
           </a:p>
         </p:txBody>
       </p:sp>
@@ -994,7 +991,7 @@
           <a:p>
             <a:pPr lvl="0"/>
             <a:r>
-              <a:rPr lang="en-US" smtClean="0"/>
+              <a:rPr lang="en-US"/>
               <a:t>Click to edit Master text styles</a:t>
             </a:r>
           </a:p>
@@ -1017,7 +1014,7 @@
           <a:p>
             <a:fld id="{C119B99F-A9E0-4865-8538-81B3FF2BBAE8}" type="datetimeFigureOut">
               <a:rPr lang="en-US" smtClean="0"/>
-              <a:t>6/11/2015</a:t>
+              <a:t>6/7/22</a:t>
             </a:fld>
             <a:endParaRPr lang="en-US"/>
           </a:p>
@@ -1111,10 +1108,9 @@
           <a:lstStyle/>
           <a:p>
             <a:r>
-              <a:rPr lang="en-US" smtClean="0"/>
+              <a:rPr lang="en-US"/>
               <a:t>Click to edit Master title style</a:t>
             </a:r>
-            <a:endParaRPr lang="en-US"/>
           </a:p>
         </p:txBody>
       </p:sp>
@@ -1140,38 +1136,37 @@
           <a:p>
             <a:pPr lvl="0"/>
             <a:r>
-              <a:rPr lang="en-US" smtClean="0"/>
+              <a:rPr lang="en-US"/>
               <a:t>Click to edit Master text styles</a:t>
             </a:r>
           </a:p>
           <a:p>
             <a:pPr lvl="1"/>
             <a:r>
-              <a:rPr lang="en-US" smtClean="0"/>
+              <a:rPr lang="en-US"/>
               <a:t>Second level</a:t>
             </a:r>
           </a:p>
           <a:p>
             <a:pPr lvl="2"/>
             <a:r>
-              <a:rPr lang="en-US" smtClean="0"/>
+              <a:rPr lang="en-US"/>
               <a:t>Third level</a:t>
             </a:r>
           </a:p>
           <a:p>
             <a:pPr lvl="3"/>
             <a:r>
-              <a:rPr lang="en-US" smtClean="0"/>
+              <a:rPr lang="en-US"/>
               <a:t>Fourth level</a:t>
             </a:r>
           </a:p>
           <a:p>
             <a:pPr lvl="4"/>
             <a:r>
-              <a:rPr lang="en-US" smtClean="0"/>
+              <a:rPr lang="en-US"/>
               <a:t>Fifth level</a:t>
             </a:r>
-            <a:endParaRPr lang="en-US"/>
           </a:p>
         </p:txBody>
       </p:sp>
@@ -1197,38 +1192,37 @@
           <a:p>
             <a:pPr lvl="0"/>
             <a:r>
-              <a:rPr lang="en-US" smtClean="0"/>
+              <a:rPr lang="en-US"/>
               <a:t>Click to edit Master text styles</a:t>
             </a:r>
           </a:p>
           <a:p>
             <a:pPr lvl="1"/>
             <a:r>
-              <a:rPr lang="en-US" smtClean="0"/>
+              <a:rPr lang="en-US"/>
               <a:t>Second level</a:t>
             </a:r>
           </a:p>
           <a:p>
             <a:pPr lvl="2"/>
             <a:r>
-              <a:rPr lang="en-US" smtClean="0"/>
+              <a:rPr lang="en-US"/>
               <a:t>Third level</a:t>
             </a:r>
           </a:p>
           <a:p>
             <a:pPr lvl="3"/>
             <a:r>
-              <a:rPr lang="en-US" smtClean="0"/>
+              <a:rPr lang="en-US"/>
               <a:t>Fourth level</a:t>
             </a:r>
           </a:p>
           <a:p>
             <a:pPr lvl="4"/>
             <a:r>
-              <a:rPr lang="en-US" smtClean="0"/>
+              <a:rPr lang="en-US"/>
               <a:t>Fifth level</a:t>
             </a:r>
-            <a:endParaRPr lang="en-US"/>
           </a:p>
         </p:txBody>
       </p:sp>
@@ -1249,7 +1243,7 @@
           <a:p>
             <a:fld id="{C119B99F-A9E0-4865-8538-81B3FF2BBAE8}" type="datetimeFigureOut">
               <a:rPr lang="en-US" smtClean="0"/>
-              <a:t>6/11/2015</a:t>
+              <a:t>6/7/22</a:t>
             </a:fld>
             <a:endParaRPr lang="en-US"/>
           </a:p>
@@ -1348,10 +1342,9 @@
           <a:lstStyle/>
           <a:p>
             <a:r>
-              <a:rPr lang="en-US" smtClean="0"/>
+              <a:rPr lang="en-US"/>
               <a:t>Click to edit Master title style</a:t>
             </a:r>
-            <a:endParaRPr lang="en-US"/>
           </a:p>
         </p:txBody>
       </p:sp>
@@ -1414,7 +1407,7 @@
           <a:p>
             <a:pPr lvl="0"/>
             <a:r>
-              <a:rPr lang="en-US" smtClean="0"/>
+              <a:rPr lang="en-US"/>
               <a:t>Click to edit Master text styles</a:t>
             </a:r>
           </a:p>
@@ -1442,38 +1435,37 @@
           <a:p>
             <a:pPr lvl="0"/>
             <a:r>
-              <a:rPr lang="en-US" smtClean="0"/>
+              <a:rPr lang="en-US"/>
               <a:t>Click to edit Master text styles</a:t>
             </a:r>
           </a:p>
           <a:p>
             <a:pPr lvl="1"/>
             <a:r>
-              <a:rPr lang="en-US" smtClean="0"/>
+              <a:rPr lang="en-US"/>
               <a:t>Second level</a:t>
             </a:r>
           </a:p>
           <a:p>
             <a:pPr lvl="2"/>
             <a:r>
-              <a:rPr lang="en-US" smtClean="0"/>
+              <a:rPr lang="en-US"/>
               <a:t>Third level</a:t>
             </a:r>
           </a:p>
           <a:p>
             <a:pPr lvl="3"/>
             <a:r>
-              <a:rPr lang="en-US" smtClean="0"/>
+              <a:rPr lang="en-US"/>
               <a:t>Fourth level</a:t>
             </a:r>
           </a:p>
           <a:p>
             <a:pPr lvl="4"/>
             <a:r>
-              <a:rPr lang="en-US" smtClean="0"/>
+              <a:rPr lang="en-US"/>
               <a:t>Fifth level</a:t>
             </a:r>
-            <a:endParaRPr lang="en-US"/>
           </a:p>
         </p:txBody>
       </p:sp>
@@ -1536,7 +1528,7 @@
           <a:p>
             <a:pPr lvl="0"/>
             <a:r>
-              <a:rPr lang="en-US" smtClean="0"/>
+              <a:rPr lang="en-US"/>
               <a:t>Click to edit Master text styles</a:t>
             </a:r>
           </a:p>
@@ -1564,38 +1556,37 @@
           <a:p>
             <a:pPr lvl="0"/>
             <a:r>
-              <a:rPr lang="en-US" smtClean="0"/>
+              <a:rPr lang="en-US"/>
               <a:t>Click to edit Master text styles</a:t>
             </a:r>
           </a:p>
           <a:p>
             <a:pPr lvl="1"/>
             <a:r>
-              <a:rPr lang="en-US" smtClean="0"/>
+              <a:rPr lang="en-US"/>
               <a:t>Second level</a:t>
             </a:r>
           </a:p>
           <a:p>
             <a:pPr lvl="2"/>
             <a:r>
-              <a:rPr lang="en-US" smtClean="0"/>
+              <a:rPr lang="en-US"/>
               <a:t>Third level</a:t>
             </a:r>
           </a:p>
           <a:p>
             <a:pPr lvl="3"/>
             <a:r>
-              <a:rPr lang="en-US" smtClean="0"/>
+              <a:rPr lang="en-US"/>
               <a:t>Fourth level</a:t>
             </a:r>
           </a:p>
           <a:p>
             <a:pPr lvl="4"/>
             <a:r>
-              <a:rPr lang="en-US" smtClean="0"/>
+              <a:rPr lang="en-US"/>
               <a:t>Fifth level</a:t>
             </a:r>
-            <a:endParaRPr lang="en-US"/>
           </a:p>
         </p:txBody>
       </p:sp>
@@ -1616,7 +1607,7 @@
           <a:p>
             <a:fld id="{C119B99F-A9E0-4865-8538-81B3FF2BBAE8}" type="datetimeFigureOut">
               <a:rPr lang="en-US" smtClean="0"/>
-              <a:t>6/11/2015</a:t>
+              <a:t>6/7/22</a:t>
             </a:fld>
             <a:endParaRPr lang="en-US"/>
           </a:p>
@@ -1710,10 +1701,9 @@
           <a:lstStyle/>
           <a:p>
             <a:r>
-              <a:rPr lang="en-US" smtClean="0"/>
+              <a:rPr lang="en-US"/>
               <a:t>Click to edit Master title style</a:t>
             </a:r>
-            <a:endParaRPr lang="en-US"/>
           </a:p>
         </p:txBody>
       </p:sp>
@@ -1734,7 +1724,7 @@
           <a:p>
             <a:fld id="{C119B99F-A9E0-4865-8538-81B3FF2BBAE8}" type="datetimeFigureOut">
               <a:rPr lang="en-US" smtClean="0"/>
-              <a:t>6/11/2015</a:t>
+              <a:t>6/7/22</a:t>
             </a:fld>
             <a:endParaRPr lang="en-US"/>
           </a:p>
@@ -1829,7 +1819,7 @@
           <a:p>
             <a:fld id="{C119B99F-A9E0-4865-8538-81B3FF2BBAE8}" type="datetimeFigureOut">
               <a:rPr lang="en-US" smtClean="0"/>
-              <a:t>6/11/2015</a:t>
+              <a:t>6/7/22</a:t>
             </a:fld>
             <a:endParaRPr lang="en-US"/>
           </a:p>
@@ -1932,10 +1922,9 @@
           </a:lstStyle>
           <a:p>
             <a:r>
-              <a:rPr lang="en-US" smtClean="0"/>
+              <a:rPr lang="en-US"/>
               <a:t>Click to edit Master title style</a:t>
             </a:r>
-            <a:endParaRPr lang="en-US"/>
           </a:p>
         </p:txBody>
       </p:sp>
@@ -1989,38 +1978,37 @@
           <a:p>
             <a:pPr lvl="0"/>
             <a:r>
-              <a:rPr lang="en-US" smtClean="0"/>
+              <a:rPr lang="en-US"/>
               <a:t>Click to edit Master text styles</a:t>
             </a:r>
           </a:p>
           <a:p>
             <a:pPr lvl="1"/>
             <a:r>
-              <a:rPr lang="en-US" smtClean="0"/>
+              <a:rPr lang="en-US"/>
               <a:t>Second level</a:t>
             </a:r>
           </a:p>
           <a:p>
             <a:pPr lvl="2"/>
             <a:r>
-              <a:rPr lang="en-US" smtClean="0"/>
+              <a:rPr lang="en-US"/>
               <a:t>Third level</a:t>
             </a:r>
           </a:p>
           <a:p>
             <a:pPr lvl="3"/>
             <a:r>
-              <a:rPr lang="en-US" smtClean="0"/>
+              <a:rPr lang="en-US"/>
               <a:t>Fourth level</a:t>
             </a:r>
           </a:p>
           <a:p>
             <a:pPr lvl="4"/>
             <a:r>
-              <a:rPr lang="en-US" smtClean="0"/>
+              <a:rPr lang="en-US"/>
               <a:t>Fifth level</a:t>
             </a:r>
-            <a:endParaRPr lang="en-US"/>
           </a:p>
         </p:txBody>
       </p:sp>
@@ -2083,7 +2071,7 @@
           <a:p>
             <a:pPr lvl="0"/>
             <a:r>
-              <a:rPr lang="en-US" smtClean="0"/>
+              <a:rPr lang="en-US"/>
               <a:t>Click to edit Master text styles</a:t>
             </a:r>
           </a:p>
@@ -2106,7 +2094,7 @@
           <a:p>
             <a:fld id="{C119B99F-A9E0-4865-8538-81B3FF2BBAE8}" type="datetimeFigureOut">
               <a:rPr lang="en-US" smtClean="0"/>
-              <a:t>6/11/2015</a:t>
+              <a:t>6/7/22</a:t>
             </a:fld>
             <a:endParaRPr lang="en-US"/>
           </a:p>
@@ -2209,10 +2197,9 @@
           </a:lstStyle>
           <a:p>
             <a:r>
-              <a:rPr lang="en-US" smtClean="0"/>
+              <a:rPr lang="en-US"/>
               <a:t>Click to edit Master title style</a:t>
             </a:r>
-            <a:endParaRPr lang="en-US"/>
           </a:p>
         </p:txBody>
       </p:sp>
@@ -2336,7 +2323,7 @@
           <a:p>
             <a:pPr lvl="0"/>
             <a:r>
-              <a:rPr lang="en-US" smtClean="0"/>
+              <a:rPr lang="en-US"/>
               <a:t>Click to edit Master text styles</a:t>
             </a:r>
           </a:p>
@@ -2359,7 +2346,7 @@
           <a:p>
             <a:fld id="{C119B99F-A9E0-4865-8538-81B3FF2BBAE8}" type="datetimeFigureOut">
               <a:rPr lang="en-US" smtClean="0"/>
-              <a:t>6/11/2015</a:t>
+              <a:t>6/7/22</a:t>
             </a:fld>
             <a:endParaRPr lang="en-US"/>
           </a:p>
@@ -2468,10 +2455,9 @@
           <a:lstStyle/>
           <a:p>
             <a:r>
-              <a:rPr lang="en-US" smtClean="0"/>
+              <a:rPr lang="en-US"/>
               <a:t>Click to edit Master title style</a:t>
             </a:r>
-            <a:endParaRPr lang="en-US"/>
           </a:p>
         </p:txBody>
       </p:sp>
@@ -2502,38 +2488,37 @@
           <a:p>
             <a:pPr lvl="0"/>
             <a:r>
-              <a:rPr lang="en-US" smtClean="0"/>
+              <a:rPr lang="en-US"/>
               <a:t>Click to edit Master text styles</a:t>
             </a:r>
           </a:p>
           <a:p>
             <a:pPr lvl="1"/>
             <a:r>
-              <a:rPr lang="en-US" smtClean="0"/>
+              <a:rPr lang="en-US"/>
               <a:t>Second level</a:t>
             </a:r>
           </a:p>
           <a:p>
             <a:pPr lvl="2"/>
             <a:r>
-              <a:rPr lang="en-US" smtClean="0"/>
+              <a:rPr lang="en-US"/>
               <a:t>Third level</a:t>
             </a:r>
           </a:p>
           <a:p>
             <a:pPr lvl="3"/>
             <a:r>
-              <a:rPr lang="en-US" smtClean="0"/>
+              <a:rPr lang="en-US"/>
               <a:t>Fourth level</a:t>
             </a:r>
           </a:p>
           <a:p>
             <a:pPr lvl="4"/>
             <a:r>
-              <a:rPr lang="en-US" smtClean="0"/>
+              <a:rPr lang="en-US"/>
               <a:t>Fifth level</a:t>
             </a:r>
-            <a:endParaRPr lang="en-US"/>
           </a:p>
         </p:txBody>
       </p:sp>
@@ -2572,7 +2557,7 @@
           <a:p>
             <a:fld id="{C119B99F-A9E0-4865-8538-81B3FF2BBAE8}" type="datetimeFigureOut">
               <a:rPr lang="en-US" smtClean="0"/>
-              <a:t>6/11/2015</a:t>
+              <a:t>6/7/22</a:t>
             </a:fld>
             <a:endParaRPr lang="en-US"/>
           </a:p>
@@ -2992,11 +2977,11 @@
             <a:avLst/>
           </a:prstGeom>
           <a:solidFill>
-            <a:srgbClr val="3080B9"/>
+            <a:srgbClr val="D25C32"/>
           </a:solidFill>
           <a:ln>
             <a:solidFill>
-              <a:srgbClr val="3080B9"/>
+              <a:srgbClr val="D25C32"/>
             </a:solidFill>
           </a:ln>
         </p:spPr>
@@ -3040,18 +3025,12 @@
             <a:avLst/>
           </a:prstGeom>
           <a:solidFill>
-            <a:schemeClr val="accent1">
-              <a:lumMod val="60000"/>
-              <a:lumOff val="40000"/>
+            <a:schemeClr val="bg1">
+              <a:lumMod val="95000"/>
             </a:schemeClr>
           </a:solidFill>
           <a:ln>
-            <a:solidFill>
-              <a:schemeClr val="accent1">
-                <a:lumMod val="60000"/>
-                <a:lumOff val="40000"/>
-              </a:schemeClr>
-            </a:solidFill>
+            <a:noFill/>
           </a:ln>
         </p:spPr>
         <p:style>
@@ -3081,38 +3060,49 @@
       </p:sp>
       <p:pic>
         <p:nvPicPr>
-          <p:cNvPr id="12" name="Picture 11"/>
+          <p:cNvPr id="1026" name="Picture 2" descr="Innovation Defined, Experiences Designed: Meet Lextant, Our New Client  Partner! • Belle Communication">
+            <a:extLst>
+              <a:ext uri="{FF2B5EF4-FFF2-40B4-BE49-F238E27FC236}">
+                <a16:creationId xmlns:a16="http://schemas.microsoft.com/office/drawing/2014/main" id="{0799D65F-1090-F328-26D5-9BF335A3D6EF}"/>
+              </a:ext>
+            </a:extLst>
+          </p:cNvPr>
           <p:cNvPicPr>
-            <a:picLocks noChangeAspect="1"/>
+            <a:picLocks noChangeAspect="1" noChangeArrowheads="1"/>
           </p:cNvPicPr>
           <p:nvPr/>
         </p:nvPicPr>
-        <p:blipFill rotWithShape="1">
-          <a:blip r:embed="rId2" cstate="print">
-            <a:duotone>
-              <a:schemeClr val="bg2">
-                <a:shade val="45000"/>
-                <a:satMod val="135000"/>
-              </a:schemeClr>
-              <a:prstClr val="white"/>
-            </a:duotone>
+        <p:blipFill>
+          <a:blip r:embed="rId2">
             <a:extLst>
               <a:ext uri="{28A0092B-C50C-407E-A947-70E740481C1C}">
                 <a14:useLocalDpi xmlns:a14="http://schemas.microsoft.com/office/drawing/2010/main" val="0"/>
               </a:ext>
             </a:extLst>
           </a:blip>
-          <a:srcRect l="72434" t="2958" r="4710" b="60202"/>
-          <a:stretch/>
+          <a:srcRect/>
+          <a:stretch>
+            <a:fillRect/>
+          </a:stretch>
         </p:blipFill>
-        <p:spPr>
-          <a:xfrm>
-            <a:off x="4987425" y="1793970"/>
-            <a:ext cx="2348398" cy="3277107"/>
+        <p:spPr bwMode="auto">
+          <a:xfrm>
+            <a:off x="4721083" y="3032778"/>
+            <a:ext cx="2902226" cy="792444"/>
           </a:xfrm>
           <a:prstGeom prst="rect">
             <a:avLst/>
           </a:prstGeom>
+          <a:noFill/>
+          <a:extLst>
+            <a:ext uri="{909E8E84-426E-40DD-AFC4-6F175D3DCCD1}">
+              <a14:hiddenFill xmlns:a14="http://schemas.microsoft.com/office/drawing/2010/main">
+                <a:solidFill>
+                  <a:srgbClr val="FFFFFF"/>
+                </a:solidFill>
+              </a14:hiddenFill>
+            </a:ext>
+          </a:extLst>
         </p:spPr>
       </p:pic>
     </p:spTree>
@@ -3125,17 +3115,129 @@
   <p:clrMapOvr>
     <a:masterClrMapping/>
   </p:clrMapOvr>
-  <p:timing>
-    <p:tnLst>
-      <p:par>
-        <p:cTn id="1" dur="indefinite" restart="never" nodeType="tmRoot"/>
-      </p:par>
-    </p:tnLst>
-  </p:timing>
 </p:sld>
 </file>
 
 <file path=ppt/slides/slide10.xml><?xml version="1.0" encoding="utf-8"?>
+<p:sld xmlns:a="http://schemas.openxmlformats.org/drawingml/2006/main" xmlns:r="http://schemas.openxmlformats.org/officeDocument/2006/relationships" xmlns:p="http://schemas.openxmlformats.org/presentationml/2006/main">
+  <p:cSld>
+    <p:spTree>
+      <p:nvGrpSpPr>
+        <p:cNvPr id="1" name=""/>
+        <p:cNvGrpSpPr/>
+        <p:nvPr/>
+      </p:nvGrpSpPr>
+      <p:grpSpPr>
+        <a:xfrm>
+          <a:off x="0" y="0"/>
+          <a:ext cx="0" cy="0"/>
+          <a:chOff x="0" y="0"/>
+          <a:chExt cx="0" cy="0"/>
+        </a:xfrm>
+      </p:grpSpPr>
+      <p:sp>
+        <p:nvSpPr>
+          <p:cNvPr id="5" name="Rectangle 4"/>
+          <p:cNvSpPr/>
+          <p:nvPr/>
+        </p:nvSpPr>
+        <p:spPr>
+          <a:xfrm>
+            <a:off x="2124631" y="400613"/>
+            <a:ext cx="8095131" cy="6063825"/>
+          </a:xfrm>
+          <a:prstGeom prst="rect">
+            <a:avLst/>
+          </a:prstGeom>
+          <a:solidFill>
+            <a:srgbClr val="7030A0"/>
+          </a:solidFill>
+          <a:ln>
+            <a:solidFill>
+              <a:srgbClr val="7030A0"/>
+            </a:solidFill>
+          </a:ln>
+        </p:spPr>
+        <p:style>
+          <a:lnRef idx="2">
+            <a:schemeClr val="accent1">
+              <a:shade val="50000"/>
+            </a:schemeClr>
+          </a:lnRef>
+          <a:fillRef idx="1">
+            <a:schemeClr val="accent1"/>
+          </a:fillRef>
+          <a:effectRef idx="0">
+            <a:schemeClr val="accent1"/>
+          </a:effectRef>
+          <a:fontRef idx="minor">
+            <a:schemeClr val="lt1"/>
+          </a:fontRef>
+        </p:style>
+        <p:txBody>
+          <a:bodyPr rtlCol="0" anchor="ctr"/>
+          <a:lstStyle/>
+          <a:p>
+            <a:pPr algn="ctr"/>
+            <a:endParaRPr lang="en-US"/>
+          </a:p>
+        </p:txBody>
+      </p:sp>
+      <p:pic>
+        <p:nvPicPr>
+          <p:cNvPr id="12290" name="Picture 2" descr="circle, color, flickr icon"/>
+          <p:cNvPicPr>
+            <a:picLocks noChangeAspect="1" noChangeArrowheads="1"/>
+          </p:cNvPicPr>
+          <p:nvPr/>
+        </p:nvPicPr>
+        <p:blipFill>
+          <a:blip r:embed="rId2">
+            <a:extLst>
+              <a:ext uri="{28A0092B-C50C-407E-A947-70E740481C1C}">
+                <a14:useLocalDpi xmlns:a14="http://schemas.microsoft.com/office/drawing/2010/main" val="0"/>
+              </a:ext>
+            </a:extLst>
+          </a:blip>
+          <a:srcRect/>
+          <a:stretch>
+            <a:fillRect/>
+          </a:stretch>
+        </p:blipFill>
+        <p:spPr bwMode="auto">
+          <a:xfrm>
+            <a:off x="3733796" y="994124"/>
+            <a:ext cx="4876800" cy="4876801"/>
+          </a:xfrm>
+          <a:prstGeom prst="rect">
+            <a:avLst/>
+          </a:prstGeom>
+          <a:noFill/>
+          <a:extLst>
+            <a:ext uri="{909E8E84-426E-40DD-AFC4-6F175D3DCCD1}">
+              <a14:hiddenFill xmlns:a14="http://schemas.microsoft.com/office/drawing/2010/main">
+                <a:solidFill>
+                  <a:srgbClr val="FFFFFF"/>
+                </a:solidFill>
+              </a14:hiddenFill>
+            </a:ext>
+          </a:extLst>
+        </p:spPr>
+      </p:pic>
+    </p:spTree>
+    <p:extLst>
+      <p:ext uri="{BB962C8B-B14F-4D97-AF65-F5344CB8AC3E}">
+        <p14:creationId xmlns:p14="http://schemas.microsoft.com/office/powerpoint/2010/main" val="1471452192"/>
+      </p:ext>
+    </p:extLst>
+  </p:cSld>
+  <p:clrMapOvr>
+    <a:masterClrMapping/>
+  </p:clrMapOvr>
+</p:sld>
+</file>
+
+<file path=ppt/slides/slide11.xml><?xml version="1.0" encoding="utf-8"?>
 <p:sld xmlns:a="http://schemas.openxmlformats.org/drawingml/2006/main" xmlns:r="http://schemas.openxmlformats.org/officeDocument/2006/relationships" xmlns:p="http://schemas.openxmlformats.org/presentationml/2006/main">
   <p:cSld>
     <p:spTree>
@@ -3300,17 +3402,10 @@
   <p:clrMapOvr>
     <a:masterClrMapping/>
   </p:clrMapOvr>
-  <p:timing>
-    <p:tnLst>
-      <p:par>
-        <p:cTn id="1" dur="indefinite" restart="never" nodeType="tmRoot"/>
-      </p:par>
-    </p:tnLst>
-  </p:timing>
 </p:sld>
 </file>
 
-<file path=ppt/slides/slide11.xml><?xml version="1.0" encoding="utf-8"?>
+<file path=ppt/slides/slide12.xml><?xml version="1.0" encoding="utf-8"?>
 <p:sld xmlns:a="http://schemas.openxmlformats.org/drawingml/2006/main" xmlns:r="http://schemas.openxmlformats.org/officeDocument/2006/relationships" xmlns:p="http://schemas.openxmlformats.org/presentationml/2006/main">
   <p:cSld>
     <p:spTree>
@@ -3705,17 +3800,10 @@
   <p:clrMapOvr>
     <a:masterClrMapping/>
   </p:clrMapOvr>
-  <p:timing>
-    <p:tnLst>
-      <p:par>
-        <p:cTn id="1" dur="indefinite" restart="never" nodeType="tmRoot"/>
-      </p:par>
-    </p:tnLst>
-  </p:timing>
 </p:sld>
 </file>
 
-<file path=ppt/slides/slide12.xml><?xml version="1.0" encoding="utf-8"?>
+<file path=ppt/slides/slide13.xml><?xml version="1.0" encoding="utf-8"?>
 <p:sld xmlns:a="http://schemas.openxmlformats.org/drawingml/2006/main" xmlns:r="http://schemas.openxmlformats.org/officeDocument/2006/relationships" xmlns:p="http://schemas.openxmlformats.org/presentationml/2006/main">
   <p:cSld>
     <p:spTree>
@@ -3887,17 +3975,10 @@
   <p:clrMapOvr>
     <a:masterClrMapping/>
   </p:clrMapOvr>
-  <p:timing>
-    <p:tnLst>
-      <p:par>
-        <p:cTn id="1" dur="indefinite" restart="never" nodeType="tmRoot"/>
-      </p:par>
-    </p:tnLst>
-  </p:timing>
 </p:sld>
 </file>
 
-<file path=ppt/slides/slide13.xml><?xml version="1.0" encoding="utf-8"?>
+<file path=ppt/slides/slide14.xml><?xml version="1.0" encoding="utf-8"?>
 <p:sld xmlns:a="http://schemas.openxmlformats.org/drawingml/2006/main" xmlns:r="http://schemas.openxmlformats.org/officeDocument/2006/relationships" xmlns:p="http://schemas.openxmlformats.org/presentationml/2006/main">
   <p:cSld>
     <p:spTree>
@@ -4013,17 +4094,10 @@
   <p:clrMapOvr>
     <a:masterClrMapping/>
   </p:clrMapOvr>
-  <p:timing>
-    <p:tnLst>
-      <p:par>
-        <p:cTn id="1" dur="indefinite" restart="never" nodeType="tmRoot"/>
-      </p:par>
-    </p:tnLst>
-  </p:timing>
 </p:sld>
 </file>
 
-<file path=ppt/slides/slide14.xml><?xml version="1.0" encoding="utf-8"?>
+<file path=ppt/slides/slide15.xml><?xml version="1.0" encoding="utf-8"?>
 <p:sld xmlns:a="http://schemas.openxmlformats.org/drawingml/2006/main" xmlns:r="http://schemas.openxmlformats.org/officeDocument/2006/relationships" xmlns:p="http://schemas.openxmlformats.org/presentationml/2006/main">
   <p:cSld>
     <p:spTree>
@@ -4192,17 +4266,178 @@
   <p:clrMapOvr>
     <a:masterClrMapping/>
   </p:clrMapOvr>
-  <p:timing>
-    <p:tnLst>
-      <p:par>
-        <p:cTn id="1" dur="indefinite" restart="never" nodeType="tmRoot"/>
-      </p:par>
-    </p:tnLst>
-  </p:timing>
 </p:sld>
 </file>
 
 <file path=ppt/slides/slide2.xml><?xml version="1.0" encoding="utf-8"?>
+<p:sld xmlns:a="http://schemas.openxmlformats.org/drawingml/2006/main" xmlns:r="http://schemas.openxmlformats.org/officeDocument/2006/relationships" xmlns:p="http://schemas.openxmlformats.org/presentationml/2006/main">
+  <p:cSld>
+    <p:spTree>
+      <p:nvGrpSpPr>
+        <p:cNvPr id="1" name=""/>
+        <p:cNvGrpSpPr/>
+        <p:nvPr/>
+      </p:nvGrpSpPr>
+      <p:grpSpPr>
+        <a:xfrm>
+          <a:off x="0" y="0"/>
+          <a:ext cx="0" cy="0"/>
+          <a:chOff x="0" y="0"/>
+          <a:chExt cx="0" cy="0"/>
+        </a:xfrm>
+      </p:grpSpPr>
+      <p:sp>
+        <p:nvSpPr>
+          <p:cNvPr id="5" name="Rectangle 4"/>
+          <p:cNvSpPr/>
+          <p:nvPr/>
+        </p:nvSpPr>
+        <p:spPr>
+          <a:xfrm>
+            <a:off x="2124631" y="400613"/>
+            <a:ext cx="8095131" cy="6063825"/>
+          </a:xfrm>
+          <a:prstGeom prst="rect">
+            <a:avLst/>
+          </a:prstGeom>
+          <a:solidFill>
+            <a:srgbClr val="3080B9"/>
+          </a:solidFill>
+          <a:ln>
+            <a:solidFill>
+              <a:srgbClr val="3080B9"/>
+            </a:solidFill>
+          </a:ln>
+        </p:spPr>
+        <p:style>
+          <a:lnRef idx="2">
+            <a:schemeClr val="accent1">
+              <a:shade val="50000"/>
+            </a:schemeClr>
+          </a:lnRef>
+          <a:fillRef idx="1">
+            <a:schemeClr val="accent1"/>
+          </a:fillRef>
+          <a:effectRef idx="0">
+            <a:schemeClr val="accent1"/>
+          </a:effectRef>
+          <a:fontRef idx="minor">
+            <a:schemeClr val="lt1"/>
+          </a:fontRef>
+        </p:style>
+        <p:txBody>
+          <a:bodyPr rtlCol="0" anchor="ctr"/>
+          <a:lstStyle/>
+          <a:p>
+            <a:pPr algn="ctr"/>
+            <a:endParaRPr lang="en-US"/>
+          </a:p>
+        </p:txBody>
+      </p:sp>
+      <p:sp>
+        <p:nvSpPr>
+          <p:cNvPr id="11" name="Oval 10"/>
+          <p:cNvSpPr/>
+          <p:nvPr/>
+        </p:nvSpPr>
+        <p:spPr>
+          <a:xfrm>
+            <a:off x="3723224" y="994124"/>
+            <a:ext cx="4876800" cy="4876801"/>
+          </a:xfrm>
+          <a:prstGeom prst="ellipse">
+            <a:avLst/>
+          </a:prstGeom>
+          <a:solidFill>
+            <a:schemeClr val="accent1">
+              <a:lumMod val="60000"/>
+              <a:lumOff val="40000"/>
+            </a:schemeClr>
+          </a:solidFill>
+          <a:ln>
+            <a:solidFill>
+              <a:schemeClr val="accent1">
+                <a:lumMod val="60000"/>
+                <a:lumOff val="40000"/>
+              </a:schemeClr>
+            </a:solidFill>
+          </a:ln>
+        </p:spPr>
+        <p:style>
+          <a:lnRef idx="2">
+            <a:schemeClr val="accent1">
+              <a:shade val="50000"/>
+            </a:schemeClr>
+          </a:lnRef>
+          <a:fillRef idx="1">
+            <a:schemeClr val="accent1"/>
+          </a:fillRef>
+          <a:effectRef idx="0">
+            <a:schemeClr val="accent1"/>
+          </a:effectRef>
+          <a:fontRef idx="minor">
+            <a:schemeClr val="lt1"/>
+          </a:fontRef>
+        </p:style>
+        <p:txBody>
+          <a:bodyPr rtlCol="0" anchor="ctr"/>
+          <a:lstStyle/>
+          <a:p>
+            <a:pPr algn="ctr"/>
+            <a:endParaRPr lang="en-US"/>
+          </a:p>
+        </p:txBody>
+      </p:sp>
+      <p:pic>
+        <p:nvPicPr>
+          <p:cNvPr id="12" name="Picture 11"/>
+          <p:cNvPicPr>
+            <a:picLocks noChangeAspect="1"/>
+          </p:cNvPicPr>
+          <p:nvPr/>
+        </p:nvPicPr>
+        <p:blipFill rotWithShape="1">
+          <a:blip r:embed="rId2" cstate="print">
+            <a:duotone>
+              <a:schemeClr val="bg2">
+                <a:shade val="45000"/>
+                <a:satMod val="135000"/>
+              </a:schemeClr>
+              <a:prstClr val="white"/>
+            </a:duotone>
+            <a:extLst>
+              <a:ext uri="{28A0092B-C50C-407E-A947-70E740481C1C}">
+                <a14:useLocalDpi xmlns:a14="http://schemas.microsoft.com/office/drawing/2010/main" val="0"/>
+              </a:ext>
+            </a:extLst>
+          </a:blip>
+          <a:srcRect l="72434" t="2958" r="4710" b="60202"/>
+          <a:stretch/>
+        </p:blipFill>
+        <p:spPr>
+          <a:xfrm>
+            <a:off x="4987425" y="1793970"/>
+            <a:ext cx="2348398" cy="3277107"/>
+          </a:xfrm>
+          <a:prstGeom prst="rect">
+            <a:avLst/>
+          </a:prstGeom>
+        </p:spPr>
+      </p:pic>
+    </p:spTree>
+    <p:extLst>
+      <p:ext uri="{BB962C8B-B14F-4D97-AF65-F5344CB8AC3E}">
+        <p14:creationId xmlns:p14="http://schemas.microsoft.com/office/powerpoint/2010/main" val="3392007150"/>
+      </p:ext>
+    </p:extLst>
+  </p:cSld>
+  <p:clrMapOvr>
+    <a:masterClrMapping/>
+  </p:clrMapOvr>
+</p:sld>
+</file>
+
+<file path=ppt/slides/slide3.xml><?xml version="1.0" encoding="utf-8"?>
 <p:sld xmlns:a="http://schemas.openxmlformats.org/drawingml/2006/main" xmlns:r="http://schemas.openxmlformats.org/officeDocument/2006/relationships" xmlns:p="http://schemas.openxmlformats.org/presentationml/2006/main">
   <p:cSld>
     <p:spTree>
@@ -4376,17 +4611,10 @@
   <p:clrMapOvr>
     <a:masterClrMapping/>
   </p:clrMapOvr>
-  <p:timing>
-    <p:tnLst>
-      <p:par>
-        <p:cTn id="1" dur="indefinite" restart="never" nodeType="tmRoot"/>
-      </p:par>
-    </p:tnLst>
-  </p:timing>
 </p:sld>
 </file>
 
-<file path=ppt/slides/slide3.xml><?xml version="1.0" encoding="utf-8"?>
+<file path=ppt/slides/slide4.xml><?xml version="1.0" encoding="utf-8"?>
 <p:sld xmlns:a="http://schemas.openxmlformats.org/drawingml/2006/main" xmlns:r="http://schemas.openxmlformats.org/officeDocument/2006/relationships" xmlns:p="http://schemas.openxmlformats.org/presentationml/2006/main">
   <p:cSld>
     <p:spTree>
@@ -4508,17 +4736,10 @@
   <p:clrMapOvr>
     <a:masterClrMapping/>
   </p:clrMapOvr>
-  <p:timing>
-    <p:tnLst>
-      <p:par>
-        <p:cTn id="1" dur="indefinite" restart="never" nodeType="tmRoot"/>
-      </p:par>
-    </p:tnLst>
-  </p:timing>
 </p:sld>
 </file>
 
-<file path=ppt/slides/slide4.xml><?xml version="1.0" encoding="utf-8"?>
+<file path=ppt/slides/slide5.xml><?xml version="1.0" encoding="utf-8"?>
 <p:sld xmlns:a="http://schemas.openxmlformats.org/drawingml/2006/main" xmlns:r="http://schemas.openxmlformats.org/officeDocument/2006/relationships" xmlns:p="http://schemas.openxmlformats.org/presentationml/2006/main">
   <p:cSld>
     <p:spTree>
@@ -4634,17 +4855,10 @@
   <p:clrMapOvr>
     <a:masterClrMapping/>
   </p:clrMapOvr>
-  <p:timing>
-    <p:tnLst>
-      <p:par>
-        <p:cTn id="1" dur="indefinite" restart="never" nodeType="tmRoot"/>
-      </p:par>
-    </p:tnLst>
-  </p:timing>
 </p:sld>
 </file>
 
-<file path=ppt/slides/slide5.xml><?xml version="1.0" encoding="utf-8"?>
+<file path=ppt/slides/slide6.xml><?xml version="1.0" encoding="utf-8"?>
 <p:sld xmlns:a="http://schemas.openxmlformats.org/drawingml/2006/main" xmlns:r="http://schemas.openxmlformats.org/officeDocument/2006/relationships" xmlns:p="http://schemas.openxmlformats.org/presentationml/2006/main">
   <p:cSld>
     <p:spTree>
@@ -4830,17 +5044,10 @@
   <p:clrMapOvr>
     <a:masterClrMapping/>
   </p:clrMapOvr>
-  <p:timing>
-    <p:tnLst>
-      <p:par>
-        <p:cTn id="1" dur="indefinite" restart="never" nodeType="tmRoot"/>
-      </p:par>
-    </p:tnLst>
-  </p:timing>
 </p:sld>
 </file>
 
-<file path=ppt/slides/slide6.xml><?xml version="1.0" encoding="utf-8"?>
+<file path=ppt/slides/slide7.xml><?xml version="1.0" encoding="utf-8"?>
 <p:sld xmlns:a="http://schemas.openxmlformats.org/drawingml/2006/main" xmlns:r="http://schemas.openxmlformats.org/officeDocument/2006/relationships" xmlns:p="http://schemas.openxmlformats.org/presentationml/2006/main">
   <p:cSld>
     <p:spTree>
@@ -5004,17 +5211,10 @@
   <p:clrMapOvr>
     <a:masterClrMapping/>
   </p:clrMapOvr>
-  <p:timing>
-    <p:tnLst>
-      <p:par>
-        <p:cTn id="1" dur="indefinite" restart="never" nodeType="tmRoot"/>
-      </p:par>
-    </p:tnLst>
-  </p:timing>
 </p:sld>
 </file>
 
-<file path=ppt/slides/slide7.xml><?xml version="1.0" encoding="utf-8"?>
+<file path=ppt/slides/slide8.xml><?xml version="1.0" encoding="utf-8"?>
 <p:sld xmlns:a="http://schemas.openxmlformats.org/drawingml/2006/main" xmlns:r="http://schemas.openxmlformats.org/officeDocument/2006/relationships" xmlns:p="http://schemas.openxmlformats.org/presentationml/2006/main">
   <p:cSld>
     <p:spTree>
@@ -5167,17 +5367,10 @@
   <p:clrMapOvr>
     <a:masterClrMapping/>
   </p:clrMapOvr>
-  <p:timing>
-    <p:tnLst>
-      <p:par>
-        <p:cTn id="1" dur="indefinite" restart="never" nodeType="tmRoot"/>
-      </p:par>
-    </p:tnLst>
-  </p:timing>
 </p:sld>
 </file>
 
-<file path=ppt/slides/slide8.xml><?xml version="1.0" encoding="utf-8"?>
+<file path=ppt/slides/slide9.xml><?xml version="1.0" encoding="utf-8"?>
 <p:sld xmlns:a="http://schemas.openxmlformats.org/drawingml/2006/main" xmlns:r="http://schemas.openxmlformats.org/officeDocument/2006/relationships" xmlns:p="http://schemas.openxmlformats.org/presentationml/2006/main">
   <p:cSld>
     <p:spTree>
@@ -5293,139 +5486,6 @@
   <p:clrMapOvr>
     <a:masterClrMapping/>
   </p:clrMapOvr>
-  <p:timing>
-    <p:tnLst>
-      <p:par>
-        <p:cTn id="1" dur="indefinite" restart="never" nodeType="tmRoot"/>
-      </p:par>
-    </p:tnLst>
-  </p:timing>
-</p:sld>
-</file>
-
-<file path=ppt/slides/slide9.xml><?xml version="1.0" encoding="utf-8"?>
-<p:sld xmlns:a="http://schemas.openxmlformats.org/drawingml/2006/main" xmlns:r="http://schemas.openxmlformats.org/officeDocument/2006/relationships" xmlns:p="http://schemas.openxmlformats.org/presentationml/2006/main">
-  <p:cSld>
-    <p:spTree>
-      <p:nvGrpSpPr>
-        <p:cNvPr id="1" name=""/>
-        <p:cNvGrpSpPr/>
-        <p:nvPr/>
-      </p:nvGrpSpPr>
-      <p:grpSpPr>
-        <a:xfrm>
-          <a:off x="0" y="0"/>
-          <a:ext cx="0" cy="0"/>
-          <a:chOff x="0" y="0"/>
-          <a:chExt cx="0" cy="0"/>
-        </a:xfrm>
-      </p:grpSpPr>
-      <p:sp>
-        <p:nvSpPr>
-          <p:cNvPr id="5" name="Rectangle 4"/>
-          <p:cNvSpPr/>
-          <p:nvPr/>
-        </p:nvSpPr>
-        <p:spPr>
-          <a:xfrm>
-            <a:off x="2124631" y="400613"/>
-            <a:ext cx="8095131" cy="6063825"/>
-          </a:xfrm>
-          <a:prstGeom prst="rect">
-            <a:avLst/>
-          </a:prstGeom>
-          <a:solidFill>
-            <a:srgbClr val="7030A0"/>
-          </a:solidFill>
-          <a:ln>
-            <a:solidFill>
-              <a:srgbClr val="7030A0"/>
-            </a:solidFill>
-          </a:ln>
-        </p:spPr>
-        <p:style>
-          <a:lnRef idx="2">
-            <a:schemeClr val="accent1">
-              <a:shade val="50000"/>
-            </a:schemeClr>
-          </a:lnRef>
-          <a:fillRef idx="1">
-            <a:schemeClr val="accent1"/>
-          </a:fillRef>
-          <a:effectRef idx="0">
-            <a:schemeClr val="accent1"/>
-          </a:effectRef>
-          <a:fontRef idx="minor">
-            <a:schemeClr val="lt1"/>
-          </a:fontRef>
-        </p:style>
-        <p:txBody>
-          <a:bodyPr rtlCol="0" anchor="ctr"/>
-          <a:lstStyle/>
-          <a:p>
-            <a:pPr algn="ctr"/>
-            <a:endParaRPr lang="en-US"/>
-          </a:p>
-        </p:txBody>
-      </p:sp>
-      <p:pic>
-        <p:nvPicPr>
-          <p:cNvPr id="12290" name="Picture 2" descr="circle, color, flickr icon"/>
-          <p:cNvPicPr>
-            <a:picLocks noChangeAspect="1" noChangeArrowheads="1"/>
-          </p:cNvPicPr>
-          <p:nvPr/>
-        </p:nvPicPr>
-        <p:blipFill>
-          <a:blip r:embed="rId2">
-            <a:extLst>
-              <a:ext uri="{28A0092B-C50C-407E-A947-70E740481C1C}">
-                <a14:useLocalDpi xmlns:a14="http://schemas.microsoft.com/office/drawing/2010/main" val="0"/>
-              </a:ext>
-            </a:extLst>
-          </a:blip>
-          <a:srcRect/>
-          <a:stretch>
-            <a:fillRect/>
-          </a:stretch>
-        </p:blipFill>
-        <p:spPr bwMode="auto">
-          <a:xfrm>
-            <a:off x="3733796" y="994124"/>
-            <a:ext cx="4876800" cy="4876801"/>
-          </a:xfrm>
-          <a:prstGeom prst="rect">
-            <a:avLst/>
-          </a:prstGeom>
-          <a:noFill/>
-          <a:extLst>
-            <a:ext uri="{909E8E84-426E-40DD-AFC4-6F175D3DCCD1}">
-              <a14:hiddenFill xmlns:a14="http://schemas.microsoft.com/office/drawing/2010/main">
-                <a:solidFill>
-                  <a:srgbClr val="FFFFFF"/>
-                </a:solidFill>
-              </a14:hiddenFill>
-            </a:ext>
-          </a:extLst>
-        </p:spPr>
-      </p:pic>
-    </p:spTree>
-    <p:extLst>
-      <p:ext uri="{BB962C8B-B14F-4D97-AF65-F5344CB8AC3E}">
-        <p14:creationId xmlns:p14="http://schemas.microsoft.com/office/powerpoint/2010/main" val="1471452192"/>
-      </p:ext>
-    </p:extLst>
-  </p:cSld>
-  <p:clrMapOvr>
-    <a:masterClrMapping/>
-  </p:clrMapOvr>
-  <p:timing>
-    <p:tnLst>
-      <p:par>
-        <p:cTn id="1" dur="indefinite" restart="never" nodeType="tmRoot"/>
-      </p:par>
-    </p:tnLst>
-  </p:timing>
 </p:sld>
 </file>
 

</xml_diff>